<commit_message>
update link verbnet part
</commit_message>
<xml_diff>
--- a/Weekly summary.pptx
+++ b/Weekly summary.pptx
@@ -5,20 +5,22 @@
     <p:sldMasterId id="2147483779" r:id="rId1"/>
   </p:sldMasterIdLst>
   <p:notesMasterIdLst>
-    <p:notesMasterId r:id="rId13"/>
+    <p:notesMasterId r:id="rId15"/>
   </p:notesMasterIdLst>
   <p:sldIdLst>
     <p:sldId id="256" r:id="rId2"/>
     <p:sldId id="257" r:id="rId3"/>
     <p:sldId id="259" r:id="rId4"/>
     <p:sldId id="261" r:id="rId5"/>
-    <p:sldId id="262" r:id="rId6"/>
-    <p:sldId id="263" r:id="rId7"/>
-    <p:sldId id="266" r:id="rId8"/>
-    <p:sldId id="264" r:id="rId9"/>
-    <p:sldId id="265" r:id="rId10"/>
-    <p:sldId id="260" r:id="rId11"/>
-    <p:sldId id="258" r:id="rId12"/>
+    <p:sldId id="268" r:id="rId6"/>
+    <p:sldId id="267" r:id="rId7"/>
+    <p:sldId id="262" r:id="rId8"/>
+    <p:sldId id="263" r:id="rId9"/>
+    <p:sldId id="266" r:id="rId10"/>
+    <p:sldId id="264" r:id="rId11"/>
+    <p:sldId id="265" r:id="rId12"/>
+    <p:sldId id="260" r:id="rId13"/>
+    <p:sldId id="258" r:id="rId14"/>
   </p:sldIdLst>
   <p:sldSz cx="12192000" cy="6858000"/>
   <p:notesSz cx="6858000" cy="9144000"/>
@@ -207,7 +209,7 @@
           <a:p>
             <a:fld id="{5C1E4B4F-065B-4806-AECA-278796DA8016}" type="datetimeFigureOut">
               <a:rPr lang="en-US" smtClean="0"/>
-              <a:t>4/24/2018</a:t>
+              <a:t>4/25/2018</a:t>
             </a:fld>
             <a:endParaRPr lang="en-US"/>
           </a:p>
@@ -539,7 +541,7 @@
           <a:p>
             <a:fld id="{AC928313-6375-4BC7-9F75-A615DAE9CC83}" type="slidenum">
               <a:rPr lang="en-US" smtClean="0"/>
-              <a:t>8</a:t>
+              <a:t>10</a:t>
             </a:fld>
             <a:endParaRPr lang="en-US"/>
           </a:p>
@@ -961,7 +963,7 @@
           <a:p>
             <a:fld id="{D22BAA74-15F4-4F7F-9702-0632D04FA5EB}" type="datetimeFigureOut">
               <a:rPr lang="en-US" smtClean="0"/>
-              <a:t>4/24/2018</a:t>
+              <a:t>4/25/2018</a:t>
             </a:fld>
             <a:endParaRPr lang="en-US"/>
           </a:p>
@@ -1140,7 +1142,7 @@
           <a:p>
             <a:fld id="{D22BAA74-15F4-4F7F-9702-0632D04FA5EB}" type="datetimeFigureOut">
               <a:rPr lang="en-US" smtClean="0"/>
-              <a:t>4/24/2018</a:t>
+              <a:t>4/25/2018</a:t>
             </a:fld>
             <a:endParaRPr lang="en-US"/>
           </a:p>
@@ -1320,7 +1322,7 @@
           <a:p>
             <a:fld id="{D22BAA74-15F4-4F7F-9702-0632D04FA5EB}" type="datetimeFigureOut">
               <a:rPr lang="en-US" smtClean="0"/>
-              <a:t>4/24/2018</a:t>
+              <a:t>4/25/2018</a:t>
             </a:fld>
             <a:endParaRPr lang="en-US"/>
           </a:p>
@@ -1490,7 +1492,7 @@
           <a:p>
             <a:fld id="{D22BAA74-15F4-4F7F-9702-0632D04FA5EB}" type="datetimeFigureOut">
               <a:rPr lang="en-US" smtClean="0"/>
-              <a:t>4/24/2018</a:t>
+              <a:t>4/25/2018</a:t>
             </a:fld>
             <a:endParaRPr lang="en-US"/>
           </a:p>
@@ -1803,7 +1805,7 @@
           <a:p>
             <a:fld id="{D22BAA74-15F4-4F7F-9702-0632D04FA5EB}" type="datetimeFigureOut">
               <a:rPr lang="en-US" smtClean="0"/>
-              <a:t>4/24/2018</a:t>
+              <a:t>4/25/2018</a:t>
             </a:fld>
             <a:endParaRPr lang="en-US"/>
           </a:p>
@@ -2189,7 +2191,7 @@
           <a:p>
             <a:fld id="{D22BAA74-15F4-4F7F-9702-0632D04FA5EB}" type="datetimeFigureOut">
               <a:rPr lang="en-US" smtClean="0"/>
-              <a:t>4/24/2018</a:t>
+              <a:t>4/25/2018</a:t>
             </a:fld>
             <a:endParaRPr lang="en-US"/>
           </a:p>
@@ -2623,7 +2625,7 @@
           <a:p>
             <a:fld id="{D22BAA74-15F4-4F7F-9702-0632D04FA5EB}" type="datetimeFigureOut">
               <a:rPr lang="en-US" smtClean="0"/>
-              <a:t>4/24/2018</a:t>
+              <a:t>4/25/2018</a:t>
             </a:fld>
             <a:endParaRPr lang="en-US"/>
           </a:p>
@@ -2741,7 +2743,7 @@
           <a:p>
             <a:fld id="{D22BAA74-15F4-4F7F-9702-0632D04FA5EB}" type="datetimeFigureOut">
               <a:rPr lang="en-US" smtClean="0"/>
-              <a:t>4/24/2018</a:t>
+              <a:t>4/25/2018</a:t>
             </a:fld>
             <a:endParaRPr lang="en-US"/>
           </a:p>
@@ -2836,7 +2838,7 @@
           <a:p>
             <a:fld id="{D22BAA74-15F4-4F7F-9702-0632D04FA5EB}" type="datetimeFigureOut">
               <a:rPr lang="en-US" smtClean="0"/>
-              <a:t>4/24/2018</a:t>
+              <a:t>4/25/2018</a:t>
             </a:fld>
             <a:endParaRPr lang="en-US"/>
           </a:p>
@@ -3186,7 +3188,7 @@
           <a:p>
             <a:fld id="{D22BAA74-15F4-4F7F-9702-0632D04FA5EB}" type="datetimeFigureOut">
               <a:rPr lang="en-US" smtClean="0"/>
-              <a:t>4/24/2018</a:t>
+              <a:t>4/25/2018</a:t>
             </a:fld>
             <a:endParaRPr lang="en-US"/>
           </a:p>
@@ -3611,7 +3613,7 @@
           <a:p>
             <a:fld id="{D22BAA74-15F4-4F7F-9702-0632D04FA5EB}" type="datetimeFigureOut">
               <a:rPr lang="en-US" smtClean="0"/>
-              <a:t>4/24/2018</a:t>
+              <a:t>4/25/2018</a:t>
             </a:fld>
             <a:endParaRPr lang="en-US"/>
           </a:p>
@@ -3892,7 +3894,7 @@
           <a:p>
             <a:fld id="{D22BAA74-15F4-4F7F-9702-0632D04FA5EB}" type="datetimeFigureOut">
               <a:rPr lang="en-US" smtClean="0"/>
-              <a:t>4/24/2018</a:t>
+              <a:t>4/25/2018</a:t>
             </a:fld>
             <a:endParaRPr lang="en-US"/>
           </a:p>
@@ -4566,6 +4568,175 @@
           <p:cNvPr id="2" name="Title 1">
             <a:extLst>
               <a:ext uri="{FF2B5EF4-FFF2-40B4-BE49-F238E27FC236}">
+                <a16:creationId xmlns:a16="http://schemas.microsoft.com/office/drawing/2014/main" id="{0896BAB0-67B5-458A-87FA-614F1243266A}"/>
+              </a:ext>
+            </a:extLst>
+          </p:cNvPr>
+          <p:cNvSpPr>
+            <a:spLocks noGrp="1"/>
+          </p:cNvSpPr>
+          <p:nvPr>
+            <p:ph type="title"/>
+          </p:nvPr>
+        </p:nvSpPr>
+        <p:spPr/>
+        <p:txBody>
+          <a:bodyPr/>
+          <a:lstStyle/>
+          <a:p>
+            <a:r>
+              <a:rPr lang="en-US" dirty="0"/>
+              <a:t>Entities in a sentence</a:t>
+            </a:r>
+          </a:p>
+        </p:txBody>
+      </p:sp>
+      <p:sp>
+        <p:nvSpPr>
+          <p:cNvPr id="3" name="Content Placeholder 2">
+            <a:extLst>
+              <a:ext uri="{FF2B5EF4-FFF2-40B4-BE49-F238E27FC236}">
+                <a16:creationId xmlns:a16="http://schemas.microsoft.com/office/drawing/2014/main" id="{7F2AEC45-C667-4A69-9FC7-8E6751E84E77}"/>
+              </a:ext>
+            </a:extLst>
+          </p:cNvPr>
+          <p:cNvSpPr>
+            <a:spLocks noGrp="1"/>
+          </p:cNvSpPr>
+          <p:nvPr>
+            <p:ph idx="1"/>
+          </p:nvPr>
+        </p:nvSpPr>
+        <p:spPr/>
+        <p:txBody>
+          <a:bodyPr/>
+          <a:lstStyle/>
+          <a:p>
+            <a:r>
+              <a:rPr lang="en-US" dirty="0"/>
+              <a:t>Actor, location, non-actor item……</a:t>
+            </a:r>
+          </a:p>
+        </p:txBody>
+      </p:sp>
+    </p:spTree>
+    <p:extLst>
+      <p:ext uri="{BB962C8B-B14F-4D97-AF65-F5344CB8AC3E}">
+        <p14:creationId xmlns:p14="http://schemas.microsoft.com/office/powerpoint/2010/main" val="1070168866"/>
+      </p:ext>
+    </p:extLst>
+  </p:cSld>
+  <p:clrMapOvr>
+    <a:masterClrMapping/>
+  </p:clrMapOvr>
+</p:sld>
+</file>
+
+<file path=ppt/slides/slide11.xml><?xml version="1.0" encoding="utf-8"?>
+<p:sld xmlns:a="http://schemas.openxmlformats.org/drawingml/2006/main" xmlns:r="http://schemas.openxmlformats.org/officeDocument/2006/relationships" xmlns:p="http://schemas.openxmlformats.org/presentationml/2006/main">
+  <p:cSld>
+    <p:spTree>
+      <p:nvGrpSpPr>
+        <p:cNvPr id="1" name=""/>
+        <p:cNvGrpSpPr/>
+        <p:nvPr/>
+      </p:nvGrpSpPr>
+      <p:grpSpPr>
+        <a:xfrm>
+          <a:off x="0" y="0"/>
+          <a:ext cx="0" cy="0"/>
+          <a:chOff x="0" y="0"/>
+          <a:chExt cx="0" cy="0"/>
+        </a:xfrm>
+      </p:grpSpPr>
+      <p:sp>
+        <p:nvSpPr>
+          <p:cNvPr id="2" name="Title 1">
+            <a:extLst>
+              <a:ext uri="{FF2B5EF4-FFF2-40B4-BE49-F238E27FC236}">
+                <a16:creationId xmlns:a16="http://schemas.microsoft.com/office/drawing/2014/main" id="{D9DD8290-0F94-4869-A15E-55897323AADF}"/>
+              </a:ext>
+            </a:extLst>
+          </p:cNvPr>
+          <p:cNvSpPr>
+            <a:spLocks noGrp="1"/>
+          </p:cNvSpPr>
+          <p:nvPr>
+            <p:ph type="title"/>
+          </p:nvPr>
+        </p:nvSpPr>
+        <p:spPr/>
+        <p:txBody>
+          <a:bodyPr/>
+          <a:lstStyle/>
+          <a:p>
+            <a:r>
+              <a:rPr lang="en-US" dirty="0"/>
+              <a:t>Visualization interface</a:t>
+            </a:r>
+          </a:p>
+        </p:txBody>
+      </p:sp>
+      <p:sp>
+        <p:nvSpPr>
+          <p:cNvPr id="3" name="Content Placeholder 2">
+            <a:extLst>
+              <a:ext uri="{FF2B5EF4-FFF2-40B4-BE49-F238E27FC236}">
+                <a16:creationId xmlns:a16="http://schemas.microsoft.com/office/drawing/2014/main" id="{99B0FBBD-26C1-4CA2-95EC-7D7F1281CB7C}"/>
+              </a:ext>
+            </a:extLst>
+          </p:cNvPr>
+          <p:cNvSpPr>
+            <a:spLocks noGrp="1"/>
+          </p:cNvSpPr>
+          <p:nvPr>
+            <p:ph idx="1"/>
+          </p:nvPr>
+        </p:nvSpPr>
+        <p:spPr/>
+        <p:txBody>
+          <a:bodyPr/>
+          <a:lstStyle/>
+          <a:p>
+            <a:endParaRPr lang="en-US"/>
+          </a:p>
+        </p:txBody>
+      </p:sp>
+    </p:spTree>
+    <p:extLst>
+      <p:ext uri="{BB962C8B-B14F-4D97-AF65-F5344CB8AC3E}">
+        <p14:creationId xmlns:p14="http://schemas.microsoft.com/office/powerpoint/2010/main" val="3211698571"/>
+      </p:ext>
+    </p:extLst>
+  </p:cSld>
+  <p:clrMapOvr>
+    <a:masterClrMapping/>
+  </p:clrMapOvr>
+</p:sld>
+</file>
+
+<file path=ppt/slides/slide12.xml><?xml version="1.0" encoding="utf-8"?>
+<p:sld xmlns:a="http://schemas.openxmlformats.org/drawingml/2006/main" xmlns:r="http://schemas.openxmlformats.org/officeDocument/2006/relationships" xmlns:p="http://schemas.openxmlformats.org/presentationml/2006/main">
+  <p:cSld>
+    <p:spTree>
+      <p:nvGrpSpPr>
+        <p:cNvPr id="1" name=""/>
+        <p:cNvGrpSpPr/>
+        <p:nvPr/>
+      </p:nvGrpSpPr>
+      <p:grpSpPr>
+        <a:xfrm>
+          <a:off x="0" y="0"/>
+          <a:ext cx="0" cy="0"/>
+          <a:chOff x="0" y="0"/>
+          <a:chExt cx="0" cy="0"/>
+        </a:xfrm>
+      </p:grpSpPr>
+      <p:sp>
+        <p:nvSpPr>
+          <p:cNvPr id="2" name="Title 1">
+            <a:extLst>
+              <a:ext uri="{FF2B5EF4-FFF2-40B4-BE49-F238E27FC236}">
                 <a16:creationId xmlns:a16="http://schemas.microsoft.com/office/drawing/2014/main" id="{D43E87D5-87D8-4A7E-A875-C44ED21E466F}"/>
               </a:ext>
             </a:extLst>
@@ -4627,7 +4798,7 @@
 </p:sld>
 </file>
 
-<file path=ppt/slides/slide11.xml><?xml version="1.0" encoding="utf-8"?>
+<file path=ppt/slides/slide13.xml><?xml version="1.0" encoding="utf-8"?>
 <p:sld xmlns:a="http://schemas.openxmlformats.org/drawingml/2006/main" xmlns:r="http://schemas.openxmlformats.org/officeDocument/2006/relationships" xmlns:p="http://schemas.openxmlformats.org/presentationml/2006/main">
   <p:cSld>
     <p:spTree>
@@ -4942,13 +5113,6 @@
             <a:endParaRPr lang="en-US" dirty="0"/>
           </a:p>
           <a:p>
-            <a:pPr lvl="1"/>
-            <a:r>
-              <a:rPr lang="en-US" dirty="0"/>
-              <a:t>Reference papers</a:t>
-            </a:r>
-          </a:p>
-          <a:p>
             <a:pPr lvl="2"/>
             <a:endParaRPr lang="en-US" dirty="0"/>
           </a:p>
@@ -5000,6 +5164,28 @@
             <a:endParaRPr lang="en-US" dirty="0"/>
           </a:p>
           <a:p>
+            <a:pPr lvl="2"/>
+            <a:r>
+              <a:rPr lang="en-US" altLang="zh-TW" dirty="0">
+                <a:hlinkClick r:id="rId3" action="ppaction://hlinksldjump"/>
+              </a:rPr>
+              <a:t>Link </a:t>
+            </a:r>
+            <a:r>
+              <a:rPr lang="en-US" altLang="zh-TW" dirty="0" err="1">
+                <a:hlinkClick r:id="rId3" action="ppaction://hlinksldjump"/>
+              </a:rPr>
+              <a:t>verbnet</a:t>
+            </a:r>
+            <a:r>
+              <a:rPr lang="en-US" altLang="zh-TW" dirty="0">
+                <a:hlinkClick r:id="rId3" action="ppaction://hlinksldjump"/>
+              </a:rPr>
+              <a:t> frame and predicate</a:t>
+            </a:r>
+            <a:endParaRPr lang="en-US" dirty="0"/>
+          </a:p>
+          <a:p>
             <a:pPr lvl="1"/>
             <a:r>
               <a:rPr lang="en-US" dirty="0"/>
@@ -5019,7 +5205,7 @@
             <a:pPr lvl="2"/>
             <a:r>
               <a:rPr lang="en-US" dirty="0">
-                <a:hlinkClick r:id="rId3" action="ppaction://hlinksldjump"/>
+                <a:hlinkClick r:id="rId4" action="ppaction://hlinksldjump"/>
               </a:rPr>
               <a:t>Task visualization interface</a:t>
             </a:r>
@@ -5029,7 +5215,7 @@
             <a:pPr lvl="2"/>
             <a:r>
               <a:rPr lang="en-US" dirty="0">
-                <a:hlinkClick r:id="rId4" action="ppaction://hlinksldjump"/>
+                <a:hlinkClick r:id="rId5" action="ppaction://hlinksldjump"/>
               </a:rPr>
               <a:t>Simple learning method for new verb</a:t>
             </a:r>
@@ -5220,6 +5406,840 @@
 </file>
 
 <file path=ppt/slides/slide5.xml><?xml version="1.0" encoding="utf-8"?>
+<p:sld xmlns:a="http://schemas.openxmlformats.org/drawingml/2006/main" xmlns:r="http://schemas.openxmlformats.org/officeDocument/2006/relationships" xmlns:p="http://schemas.openxmlformats.org/presentationml/2006/main">
+  <p:cSld>
+    <p:spTree>
+      <p:nvGrpSpPr>
+        <p:cNvPr id="1" name=""/>
+        <p:cNvGrpSpPr/>
+        <p:nvPr/>
+      </p:nvGrpSpPr>
+      <p:grpSpPr>
+        <a:xfrm>
+          <a:off x="0" y="0"/>
+          <a:ext cx="0" cy="0"/>
+          <a:chOff x="0" y="0"/>
+          <a:chExt cx="0" cy="0"/>
+        </a:xfrm>
+      </p:grpSpPr>
+      <p:sp>
+        <p:nvSpPr>
+          <p:cNvPr id="2" name="Title 1">
+            <a:extLst>
+              <a:ext uri="{FF2B5EF4-FFF2-40B4-BE49-F238E27FC236}">
+                <a16:creationId xmlns:a16="http://schemas.microsoft.com/office/drawing/2014/main" id="{727E0659-E569-4423-919C-6E5A040F2A45}"/>
+              </a:ext>
+            </a:extLst>
+          </p:cNvPr>
+          <p:cNvSpPr>
+            <a:spLocks noGrp="1"/>
+          </p:cNvSpPr>
+          <p:nvPr>
+            <p:ph type="title"/>
+          </p:nvPr>
+        </p:nvSpPr>
+        <p:spPr/>
+        <p:txBody>
+          <a:bodyPr/>
+          <a:lstStyle/>
+          <a:p>
+            <a:r>
+              <a:rPr lang="en-US" dirty="0"/>
+              <a:t>Process</a:t>
+            </a:r>
+          </a:p>
+        </p:txBody>
+      </p:sp>
+      <p:sp>
+        <p:nvSpPr>
+          <p:cNvPr id="4" name="Rectangle 3">
+            <a:extLst>
+              <a:ext uri="{FF2B5EF4-FFF2-40B4-BE49-F238E27FC236}">
+                <a16:creationId xmlns:a16="http://schemas.microsoft.com/office/drawing/2014/main" id="{9438CAA8-617E-4512-9BF0-29A0BE46B9E7}"/>
+              </a:ext>
+            </a:extLst>
+          </p:cNvPr>
+          <p:cNvSpPr/>
+          <p:nvPr/>
+        </p:nvSpPr>
+        <p:spPr>
+          <a:xfrm>
+            <a:off x="914401" y="1957417"/>
+            <a:ext cx="4552749" cy="490888"/>
+          </a:xfrm>
+          <a:prstGeom prst="rect">
+            <a:avLst/>
+          </a:prstGeom>
+        </p:spPr>
+        <p:style>
+          <a:lnRef idx="2">
+            <a:schemeClr val="accent5"/>
+          </a:lnRef>
+          <a:fillRef idx="1">
+            <a:schemeClr val="lt1"/>
+          </a:fillRef>
+          <a:effectRef idx="0">
+            <a:schemeClr val="accent5"/>
+          </a:effectRef>
+          <a:fontRef idx="minor">
+            <a:schemeClr val="dk1"/>
+          </a:fontRef>
+        </p:style>
+        <p:txBody>
+          <a:bodyPr rtlCol="0" anchor="ctr"/>
+          <a:lstStyle/>
+          <a:p>
+            <a:pPr algn="ctr"/>
+            <a:r>
+              <a:rPr lang="en-US" dirty="0"/>
+              <a:t>Sentence:  Mary travelled to the hallway.</a:t>
+            </a:r>
+          </a:p>
+        </p:txBody>
+      </p:sp>
+      <p:sp>
+        <p:nvSpPr>
+          <p:cNvPr id="5" name="Rectangle 4">
+            <a:extLst>
+              <a:ext uri="{FF2B5EF4-FFF2-40B4-BE49-F238E27FC236}">
+                <a16:creationId xmlns:a16="http://schemas.microsoft.com/office/drawing/2014/main" id="{7EBDCC41-239A-45BB-ADCC-A39A5DDEA2F0}"/>
+              </a:ext>
+            </a:extLst>
+          </p:cNvPr>
+          <p:cNvSpPr/>
+          <p:nvPr/>
+        </p:nvSpPr>
+        <p:spPr>
+          <a:xfrm>
+            <a:off x="943276" y="3214837"/>
+            <a:ext cx="3214838" cy="3551723"/>
+          </a:xfrm>
+          <a:prstGeom prst="rect">
+            <a:avLst/>
+          </a:prstGeom>
+        </p:spPr>
+        <p:style>
+          <a:lnRef idx="2">
+            <a:schemeClr val="accent1">
+              <a:shade val="50000"/>
+            </a:schemeClr>
+          </a:lnRef>
+          <a:fillRef idx="1">
+            <a:schemeClr val="accent1"/>
+          </a:fillRef>
+          <a:effectRef idx="0">
+            <a:schemeClr val="accent1"/>
+          </a:effectRef>
+          <a:fontRef idx="minor">
+            <a:schemeClr val="lt1"/>
+          </a:fontRef>
+        </p:style>
+        <p:txBody>
+          <a:bodyPr rtlCol="0" anchor="ctr"/>
+          <a:lstStyle/>
+          <a:p>
+            <a:pPr algn="ctr"/>
+            <a:endParaRPr lang="en-US"/>
+          </a:p>
+        </p:txBody>
+      </p:sp>
+      <p:sp>
+        <p:nvSpPr>
+          <p:cNvPr id="6" name="Rectangle 5">
+            <a:extLst>
+              <a:ext uri="{FF2B5EF4-FFF2-40B4-BE49-F238E27FC236}">
+                <a16:creationId xmlns:a16="http://schemas.microsoft.com/office/drawing/2014/main" id="{E82C3C68-9154-49B4-84F1-2736913B7055}"/>
+              </a:ext>
+            </a:extLst>
+          </p:cNvPr>
+          <p:cNvSpPr/>
+          <p:nvPr/>
+        </p:nvSpPr>
+        <p:spPr>
+          <a:xfrm>
+            <a:off x="1069848" y="3347184"/>
+            <a:ext cx="2926080" cy="1643514"/>
+          </a:xfrm>
+          <a:prstGeom prst="rect">
+            <a:avLst/>
+          </a:prstGeom>
+        </p:spPr>
+        <p:style>
+          <a:lnRef idx="2">
+            <a:schemeClr val="accent5"/>
+          </a:lnRef>
+          <a:fillRef idx="1">
+            <a:schemeClr val="lt1"/>
+          </a:fillRef>
+          <a:effectRef idx="0">
+            <a:schemeClr val="accent5"/>
+          </a:effectRef>
+          <a:fontRef idx="minor">
+            <a:schemeClr val="dk1"/>
+          </a:fontRef>
+        </p:style>
+        <p:txBody>
+          <a:bodyPr rtlCol="0" anchor="ctr"/>
+          <a:lstStyle/>
+          <a:p>
+            <a:r>
+              <a:rPr lang="en-US" dirty="0"/>
+              <a:t>Entities:</a:t>
+            </a:r>
+          </a:p>
+          <a:p>
+            <a:r>
+              <a:rPr lang="en-US" dirty="0"/>
+              <a:t>{</a:t>
+            </a:r>
+          </a:p>
+          <a:p>
+            <a:r>
+              <a:rPr lang="en-US" dirty="0"/>
+              <a:t>	Location:{   hallway  },</a:t>
+            </a:r>
+          </a:p>
+          <a:p>
+            <a:r>
+              <a:rPr lang="en-US" dirty="0"/>
+              <a:t>	Item: {    },</a:t>
+            </a:r>
+          </a:p>
+          <a:p>
+            <a:r>
+              <a:rPr lang="en-US" dirty="0"/>
+              <a:t>	Actor: { Mary}</a:t>
+            </a:r>
+          </a:p>
+          <a:p>
+            <a:r>
+              <a:rPr lang="en-US" dirty="0"/>
+              <a:t>}</a:t>
+            </a:r>
+          </a:p>
+        </p:txBody>
+      </p:sp>
+      <p:sp>
+        <p:nvSpPr>
+          <p:cNvPr id="7" name="Rectangle 6">
+            <a:extLst>
+              <a:ext uri="{FF2B5EF4-FFF2-40B4-BE49-F238E27FC236}">
+                <a16:creationId xmlns:a16="http://schemas.microsoft.com/office/drawing/2014/main" id="{0924F1ED-9A29-4323-AB0F-952D2C913FEC}"/>
+              </a:ext>
+            </a:extLst>
+          </p:cNvPr>
+          <p:cNvSpPr/>
+          <p:nvPr/>
+        </p:nvSpPr>
+        <p:spPr>
+          <a:xfrm>
+            <a:off x="1069848" y="5040026"/>
+            <a:ext cx="2926080" cy="1643514"/>
+          </a:xfrm>
+          <a:prstGeom prst="rect">
+            <a:avLst/>
+          </a:prstGeom>
+        </p:spPr>
+        <p:style>
+          <a:lnRef idx="2">
+            <a:schemeClr val="accent5"/>
+          </a:lnRef>
+          <a:fillRef idx="1">
+            <a:schemeClr val="lt1"/>
+          </a:fillRef>
+          <a:effectRef idx="0">
+            <a:schemeClr val="accent5"/>
+          </a:effectRef>
+          <a:fontRef idx="minor">
+            <a:schemeClr val="dk1"/>
+          </a:fontRef>
+        </p:style>
+        <p:txBody>
+          <a:bodyPr rtlCol="0" anchor="ctr"/>
+          <a:lstStyle/>
+          <a:p>
+            <a:r>
+              <a:rPr lang="en-US" dirty="0"/>
+              <a:t>Action:</a:t>
+            </a:r>
+          </a:p>
+          <a:p>
+            <a:r>
+              <a:rPr lang="en-US" dirty="0"/>
+              <a:t>{</a:t>
+            </a:r>
+          </a:p>
+          <a:p>
+            <a:r>
+              <a:rPr lang="en-US" dirty="0"/>
+              <a:t>	travelled</a:t>
+            </a:r>
+          </a:p>
+          <a:p>
+            <a:r>
+              <a:rPr lang="en-US" dirty="0"/>
+              <a:t>}</a:t>
+            </a:r>
+          </a:p>
+        </p:txBody>
+      </p:sp>
+      <p:sp>
+        <p:nvSpPr>
+          <p:cNvPr id="8" name="Rectangle 7">
+            <a:extLst>
+              <a:ext uri="{FF2B5EF4-FFF2-40B4-BE49-F238E27FC236}">
+                <a16:creationId xmlns:a16="http://schemas.microsoft.com/office/drawing/2014/main" id="{F60F136B-865E-4890-B4A7-CE9EA6E51B10}"/>
+              </a:ext>
+            </a:extLst>
+          </p:cNvPr>
+          <p:cNvSpPr/>
+          <p:nvPr/>
+        </p:nvSpPr>
+        <p:spPr>
+          <a:xfrm>
+            <a:off x="6639830" y="1267646"/>
+            <a:ext cx="3630328" cy="490888"/>
+          </a:xfrm>
+          <a:prstGeom prst="rect">
+            <a:avLst/>
+          </a:prstGeom>
+        </p:spPr>
+        <p:style>
+          <a:lnRef idx="2">
+            <a:schemeClr val="accent5"/>
+          </a:lnRef>
+          <a:fillRef idx="1">
+            <a:schemeClr val="lt1"/>
+          </a:fillRef>
+          <a:effectRef idx="0">
+            <a:schemeClr val="accent5"/>
+          </a:effectRef>
+          <a:fontRef idx="minor">
+            <a:schemeClr val="dk1"/>
+          </a:fontRef>
+        </p:style>
+        <p:txBody>
+          <a:bodyPr rtlCol="0" anchor="ctr"/>
+          <a:lstStyle/>
+          <a:p>
+            <a:r>
+              <a:rPr lang="en-US" dirty="0"/>
+              <a:t>Frame 1:  TO (DT) </a:t>
+            </a:r>
+            <a:r>
+              <a:rPr lang="en-US" dirty="0">
+                <a:solidFill>
+                  <a:srgbClr val="0070C0"/>
+                </a:solidFill>
+              </a:rPr>
+              <a:t>NP</a:t>
+            </a:r>
+          </a:p>
+        </p:txBody>
+      </p:sp>
+      <p:sp>
+        <p:nvSpPr>
+          <p:cNvPr id="9" name="Rectangle 8">
+            <a:extLst>
+              <a:ext uri="{FF2B5EF4-FFF2-40B4-BE49-F238E27FC236}">
+                <a16:creationId xmlns:a16="http://schemas.microsoft.com/office/drawing/2014/main" id="{ADAEBD8B-04D6-454A-87FF-EEFD095AD26B}"/>
+              </a:ext>
+            </a:extLst>
+          </p:cNvPr>
+          <p:cNvSpPr/>
+          <p:nvPr/>
+        </p:nvSpPr>
+        <p:spPr>
+          <a:xfrm>
+            <a:off x="6639830" y="1848532"/>
+            <a:ext cx="3630328" cy="490888"/>
+          </a:xfrm>
+          <a:prstGeom prst="rect">
+            <a:avLst/>
+          </a:prstGeom>
+        </p:spPr>
+        <p:style>
+          <a:lnRef idx="2">
+            <a:schemeClr val="accent5"/>
+          </a:lnRef>
+          <a:fillRef idx="1">
+            <a:schemeClr val="lt1"/>
+          </a:fillRef>
+          <a:effectRef idx="0">
+            <a:schemeClr val="accent5"/>
+          </a:effectRef>
+          <a:fontRef idx="minor">
+            <a:schemeClr val="dk1"/>
+          </a:fontRef>
+        </p:style>
+        <p:txBody>
+          <a:bodyPr rtlCol="0" anchor="ctr"/>
+          <a:lstStyle/>
+          <a:p>
+            <a:r>
+              <a:rPr lang="en-US" dirty="0"/>
+              <a:t>Frame 2:  </a:t>
+            </a:r>
+            <a:r>
+              <a:rPr lang="en-US" dirty="0">
+                <a:solidFill>
+                  <a:srgbClr val="0070C0"/>
+                </a:solidFill>
+              </a:rPr>
+              <a:t>NNP</a:t>
+            </a:r>
+            <a:r>
+              <a:rPr lang="en-US" dirty="0"/>
+              <a:t>  VB</a:t>
+            </a:r>
+          </a:p>
+        </p:txBody>
+      </p:sp>
+      <p:sp>
+        <p:nvSpPr>
+          <p:cNvPr id="10" name="Rectangle 9">
+            <a:extLst>
+              <a:ext uri="{FF2B5EF4-FFF2-40B4-BE49-F238E27FC236}">
+                <a16:creationId xmlns:a16="http://schemas.microsoft.com/office/drawing/2014/main" id="{AC7296E4-7791-43F7-B142-7B733D6FBCF4}"/>
+              </a:ext>
+            </a:extLst>
+          </p:cNvPr>
+          <p:cNvSpPr/>
+          <p:nvPr/>
+        </p:nvSpPr>
+        <p:spPr>
+          <a:xfrm>
+            <a:off x="6639830" y="2468880"/>
+            <a:ext cx="3630328" cy="490888"/>
+          </a:xfrm>
+          <a:prstGeom prst="rect">
+            <a:avLst/>
+          </a:prstGeom>
+        </p:spPr>
+        <p:style>
+          <a:lnRef idx="2">
+            <a:schemeClr val="accent5"/>
+          </a:lnRef>
+          <a:fillRef idx="1">
+            <a:schemeClr val="lt1"/>
+          </a:fillRef>
+          <a:effectRef idx="0">
+            <a:schemeClr val="accent5"/>
+          </a:effectRef>
+          <a:fontRef idx="minor">
+            <a:schemeClr val="dk1"/>
+          </a:fontRef>
+        </p:style>
+        <p:txBody>
+          <a:bodyPr rtlCol="0" anchor="ctr"/>
+          <a:lstStyle/>
+          <a:p>
+            <a:r>
+              <a:rPr lang="en-US" dirty="0"/>
+              <a:t>Frame </a:t>
+            </a:r>
+            <a:r>
+              <a:rPr lang="en-US" altLang="zh-TW" dirty="0"/>
+              <a:t>3</a:t>
+            </a:r>
+            <a:r>
+              <a:rPr lang="en-US" dirty="0"/>
+              <a:t>:  NNP  VB</a:t>
+            </a:r>
+            <a:r>
+              <a:rPr lang="zh-TW" altLang="en-US" dirty="0"/>
+              <a:t>  </a:t>
+            </a:r>
+            <a:r>
+              <a:rPr lang="en-US" altLang="zh-TW" dirty="0">
+                <a:solidFill>
+                  <a:srgbClr val="0070C0"/>
+                </a:solidFill>
+              </a:rPr>
+              <a:t>NN</a:t>
+            </a:r>
+            <a:endParaRPr lang="en-US" dirty="0">
+              <a:solidFill>
+                <a:srgbClr val="0070C0"/>
+              </a:solidFill>
+            </a:endParaRPr>
+          </a:p>
+        </p:txBody>
+      </p:sp>
+      <p:sp>
+        <p:nvSpPr>
+          <p:cNvPr id="11" name="TextBox 10">
+            <a:extLst>
+              <a:ext uri="{FF2B5EF4-FFF2-40B4-BE49-F238E27FC236}">
+                <a16:creationId xmlns:a16="http://schemas.microsoft.com/office/drawing/2014/main" id="{306AC4B8-9259-4B7C-B28D-C8925FDD124C}"/>
+              </a:ext>
+            </a:extLst>
+          </p:cNvPr>
+          <p:cNvSpPr txBox="1"/>
+          <p:nvPr/>
+        </p:nvSpPr>
+        <p:spPr>
+          <a:xfrm>
+            <a:off x="10337534" y="1386038"/>
+            <a:ext cx="1443789" cy="369332"/>
+          </a:xfrm>
+          <a:prstGeom prst="rect">
+            <a:avLst/>
+          </a:prstGeom>
+          <a:noFill/>
+        </p:spPr>
+        <p:txBody>
+          <a:bodyPr wrap="square" rtlCol="0">
+            <a:spAutoFit/>
+          </a:bodyPr>
+          <a:lstStyle/>
+          <a:p>
+            <a:r>
+              <a:rPr lang="en-US" altLang="zh-TW" dirty="0"/>
+              <a:t>Location</a:t>
+            </a:r>
+            <a:endParaRPr lang="en-US" dirty="0"/>
+          </a:p>
+        </p:txBody>
+      </p:sp>
+      <p:sp>
+        <p:nvSpPr>
+          <p:cNvPr id="12" name="TextBox 11">
+            <a:extLst>
+              <a:ext uri="{FF2B5EF4-FFF2-40B4-BE49-F238E27FC236}">
+                <a16:creationId xmlns:a16="http://schemas.microsoft.com/office/drawing/2014/main" id="{A04DEE74-7900-4566-985C-6A0E0B54821E}"/>
+              </a:ext>
+            </a:extLst>
+          </p:cNvPr>
+          <p:cNvSpPr txBox="1"/>
+          <p:nvPr/>
+        </p:nvSpPr>
+        <p:spPr>
+          <a:xfrm>
+            <a:off x="10337533" y="1938185"/>
+            <a:ext cx="1443789" cy="369332"/>
+          </a:xfrm>
+          <a:prstGeom prst="rect">
+            <a:avLst/>
+          </a:prstGeom>
+          <a:noFill/>
+        </p:spPr>
+        <p:txBody>
+          <a:bodyPr wrap="square" rtlCol="0">
+            <a:spAutoFit/>
+          </a:bodyPr>
+          <a:lstStyle/>
+          <a:p>
+            <a:r>
+              <a:rPr lang="en-US" altLang="zh-TW" dirty="0"/>
+              <a:t>Actor</a:t>
+            </a:r>
+            <a:endParaRPr lang="en-US" dirty="0"/>
+          </a:p>
+        </p:txBody>
+      </p:sp>
+      <p:sp>
+        <p:nvSpPr>
+          <p:cNvPr id="13" name="TextBox 12">
+            <a:extLst>
+              <a:ext uri="{FF2B5EF4-FFF2-40B4-BE49-F238E27FC236}">
+                <a16:creationId xmlns:a16="http://schemas.microsoft.com/office/drawing/2014/main" id="{467AACD1-5880-4ADF-8A40-8AD6F7938853}"/>
+              </a:ext>
+            </a:extLst>
+          </p:cNvPr>
+          <p:cNvSpPr txBox="1"/>
+          <p:nvPr/>
+        </p:nvSpPr>
+        <p:spPr>
+          <a:xfrm>
+            <a:off x="10345557" y="2483318"/>
+            <a:ext cx="1443789" cy="369332"/>
+          </a:xfrm>
+          <a:prstGeom prst="rect">
+            <a:avLst/>
+          </a:prstGeom>
+          <a:noFill/>
+        </p:spPr>
+        <p:txBody>
+          <a:bodyPr wrap="square" rtlCol="0">
+            <a:spAutoFit/>
+          </a:bodyPr>
+          <a:lstStyle/>
+          <a:p>
+            <a:r>
+              <a:rPr lang="en-US" altLang="zh-TW" dirty="0"/>
+              <a:t>Item</a:t>
+            </a:r>
+            <a:endParaRPr lang="en-US" dirty="0"/>
+          </a:p>
+        </p:txBody>
+      </p:sp>
+      <p:sp>
+        <p:nvSpPr>
+          <p:cNvPr id="14" name="Arrow: Right 13">
+            <a:extLst>
+              <a:ext uri="{FF2B5EF4-FFF2-40B4-BE49-F238E27FC236}">
+                <a16:creationId xmlns:a16="http://schemas.microsoft.com/office/drawing/2014/main" id="{6153C5DD-3D44-45C1-AB0E-8582E800A879}"/>
+              </a:ext>
+            </a:extLst>
+          </p:cNvPr>
+          <p:cNvSpPr/>
+          <p:nvPr/>
+        </p:nvSpPr>
+        <p:spPr>
+          <a:xfrm>
+            <a:off x="5606718" y="2122851"/>
+            <a:ext cx="861459" cy="184666"/>
+          </a:xfrm>
+          <a:prstGeom prst="rightArrow">
+            <a:avLst/>
+          </a:prstGeom>
+        </p:spPr>
+        <p:style>
+          <a:lnRef idx="2">
+            <a:schemeClr val="accent1">
+              <a:shade val="50000"/>
+            </a:schemeClr>
+          </a:lnRef>
+          <a:fillRef idx="1">
+            <a:schemeClr val="accent1"/>
+          </a:fillRef>
+          <a:effectRef idx="0">
+            <a:schemeClr val="accent1"/>
+          </a:effectRef>
+          <a:fontRef idx="minor">
+            <a:schemeClr val="lt1"/>
+          </a:fontRef>
+        </p:style>
+        <p:txBody>
+          <a:bodyPr rtlCol="0" anchor="ctr"/>
+          <a:lstStyle/>
+          <a:p>
+            <a:pPr algn="ctr"/>
+            <a:endParaRPr lang="en-US"/>
+          </a:p>
+        </p:txBody>
+      </p:sp>
+      <p:sp>
+        <p:nvSpPr>
+          <p:cNvPr id="15" name="TextBox 14">
+            <a:extLst>
+              <a:ext uri="{FF2B5EF4-FFF2-40B4-BE49-F238E27FC236}">
+                <a16:creationId xmlns:a16="http://schemas.microsoft.com/office/drawing/2014/main" id="{011B0E5F-64E9-4BBC-97AE-96E3FE1D47B7}"/>
+              </a:ext>
+            </a:extLst>
+          </p:cNvPr>
+          <p:cNvSpPr txBox="1"/>
+          <p:nvPr/>
+        </p:nvSpPr>
+        <p:spPr>
+          <a:xfrm>
+            <a:off x="5582654" y="2340400"/>
+            <a:ext cx="1443789" cy="369332"/>
+          </a:xfrm>
+          <a:prstGeom prst="rect">
+            <a:avLst/>
+          </a:prstGeom>
+          <a:noFill/>
+        </p:spPr>
+        <p:txBody>
+          <a:bodyPr wrap="square" rtlCol="0">
+            <a:spAutoFit/>
+          </a:bodyPr>
+          <a:lstStyle/>
+          <a:p>
+            <a:r>
+              <a:rPr lang="en-US" altLang="zh-TW" dirty="0"/>
+              <a:t>match</a:t>
+            </a:r>
+            <a:endParaRPr lang="en-US" dirty="0"/>
+          </a:p>
+        </p:txBody>
+      </p:sp>
+    </p:spTree>
+    <p:extLst>
+      <p:ext uri="{BB962C8B-B14F-4D97-AF65-F5344CB8AC3E}">
+        <p14:creationId xmlns:p14="http://schemas.microsoft.com/office/powerpoint/2010/main" val="3936181234"/>
+      </p:ext>
+    </p:extLst>
+  </p:cSld>
+  <p:clrMapOvr>
+    <a:masterClrMapping/>
+  </p:clrMapOvr>
+</p:sld>
+</file>
+
+<file path=ppt/slides/slide6.xml><?xml version="1.0" encoding="utf-8"?>
+<p:sld xmlns:a="http://schemas.openxmlformats.org/drawingml/2006/main" xmlns:r="http://schemas.openxmlformats.org/officeDocument/2006/relationships" xmlns:p="http://schemas.openxmlformats.org/presentationml/2006/main">
+  <p:cSld>
+    <p:spTree>
+      <p:nvGrpSpPr>
+        <p:cNvPr id="1" name=""/>
+        <p:cNvGrpSpPr/>
+        <p:nvPr/>
+      </p:nvGrpSpPr>
+      <p:grpSpPr>
+        <a:xfrm>
+          <a:off x="0" y="0"/>
+          <a:ext cx="0" cy="0"/>
+          <a:chOff x="0" y="0"/>
+          <a:chExt cx="0" cy="0"/>
+        </a:xfrm>
+      </p:grpSpPr>
+      <p:sp>
+        <p:nvSpPr>
+          <p:cNvPr id="2" name="Title 1">
+            <a:extLst>
+              <a:ext uri="{FF2B5EF4-FFF2-40B4-BE49-F238E27FC236}">
+                <a16:creationId xmlns:a16="http://schemas.microsoft.com/office/drawing/2014/main" id="{8B3A3254-6BAC-40DC-80A6-1F677987200D}"/>
+              </a:ext>
+            </a:extLst>
+          </p:cNvPr>
+          <p:cNvSpPr>
+            <a:spLocks noGrp="1"/>
+          </p:cNvSpPr>
+          <p:nvPr>
+            <p:ph type="title"/>
+          </p:nvPr>
+        </p:nvSpPr>
+        <p:spPr/>
+        <p:txBody>
+          <a:bodyPr/>
+          <a:lstStyle/>
+          <a:p>
+            <a:r>
+              <a:rPr lang="en-US" dirty="0"/>
+              <a:t>Link </a:t>
+            </a:r>
+            <a:r>
+              <a:rPr lang="en-US" dirty="0" err="1"/>
+              <a:t>Verbnet</a:t>
+            </a:r>
+            <a:endParaRPr lang="en-US" dirty="0"/>
+          </a:p>
+        </p:txBody>
+      </p:sp>
+      <p:sp>
+        <p:nvSpPr>
+          <p:cNvPr id="7" name="Text Placeholder 6">
+            <a:extLst>
+              <a:ext uri="{FF2B5EF4-FFF2-40B4-BE49-F238E27FC236}">
+                <a16:creationId xmlns:a16="http://schemas.microsoft.com/office/drawing/2014/main" id="{F39CDEEE-9BB8-4AC3-9E51-F9EB43C9C717}"/>
+              </a:ext>
+            </a:extLst>
+          </p:cNvPr>
+          <p:cNvSpPr>
+            <a:spLocks noGrp="1"/>
+          </p:cNvSpPr>
+          <p:nvPr>
+            <p:ph type="body" idx="1"/>
+          </p:nvPr>
+        </p:nvSpPr>
+        <p:spPr/>
+        <p:txBody>
+          <a:bodyPr/>
+          <a:lstStyle/>
+          <a:p>
+            <a:r>
+              <a:rPr lang="en-US" dirty="0"/>
+              <a:t>Simplified</a:t>
+            </a:r>
+          </a:p>
+        </p:txBody>
+      </p:sp>
+      <p:sp>
+        <p:nvSpPr>
+          <p:cNvPr id="8" name="Content Placeholder 7">
+            <a:extLst>
+              <a:ext uri="{FF2B5EF4-FFF2-40B4-BE49-F238E27FC236}">
+                <a16:creationId xmlns:a16="http://schemas.microsoft.com/office/drawing/2014/main" id="{655997AE-74A3-40D7-A0ED-553A9A423708}"/>
+              </a:ext>
+            </a:extLst>
+          </p:cNvPr>
+          <p:cNvSpPr>
+            <a:spLocks noGrp="1"/>
+          </p:cNvSpPr>
+          <p:nvPr>
+            <p:ph sz="half" idx="2"/>
+          </p:nvPr>
+        </p:nvSpPr>
+        <p:spPr/>
+        <p:txBody>
+          <a:bodyPr/>
+          <a:lstStyle/>
+          <a:p>
+            <a:endParaRPr lang="en-US" dirty="0"/>
+          </a:p>
+        </p:txBody>
+      </p:sp>
+      <p:sp>
+        <p:nvSpPr>
+          <p:cNvPr id="9" name="Text Placeholder 8">
+            <a:extLst>
+              <a:ext uri="{FF2B5EF4-FFF2-40B4-BE49-F238E27FC236}">
+                <a16:creationId xmlns:a16="http://schemas.microsoft.com/office/drawing/2014/main" id="{ABB6C4A0-BDA8-48E4-86B6-26D340D9E898}"/>
+              </a:ext>
+            </a:extLst>
+          </p:cNvPr>
+          <p:cNvSpPr>
+            <a:spLocks noGrp="1"/>
+          </p:cNvSpPr>
+          <p:nvPr>
+            <p:ph type="body" sz="quarter" idx="3"/>
+          </p:nvPr>
+        </p:nvSpPr>
+        <p:spPr/>
+        <p:txBody>
+          <a:bodyPr/>
+          <a:lstStyle/>
+          <a:p>
+            <a:r>
+              <a:rPr lang="en-US" dirty="0" err="1"/>
+              <a:t>Verbnet</a:t>
+            </a:r>
+            <a:endParaRPr lang="en-US" dirty="0"/>
+          </a:p>
+        </p:txBody>
+      </p:sp>
+      <p:sp>
+        <p:nvSpPr>
+          <p:cNvPr id="10" name="Content Placeholder 9">
+            <a:extLst>
+              <a:ext uri="{FF2B5EF4-FFF2-40B4-BE49-F238E27FC236}">
+                <a16:creationId xmlns:a16="http://schemas.microsoft.com/office/drawing/2014/main" id="{0DFA430E-153F-4B88-AF4D-CEA925C0EF4B}"/>
+              </a:ext>
+            </a:extLst>
+          </p:cNvPr>
+          <p:cNvSpPr>
+            <a:spLocks noGrp="1"/>
+          </p:cNvSpPr>
+          <p:nvPr>
+            <p:ph sz="quarter" idx="4"/>
+          </p:nvPr>
+        </p:nvSpPr>
+        <p:spPr/>
+        <p:txBody>
+          <a:bodyPr/>
+          <a:lstStyle/>
+          <a:p>
+            <a:endParaRPr lang="en-US"/>
+          </a:p>
+        </p:txBody>
+      </p:sp>
+    </p:spTree>
+    <p:extLst>
+      <p:ext uri="{BB962C8B-B14F-4D97-AF65-F5344CB8AC3E}">
+        <p14:creationId xmlns:p14="http://schemas.microsoft.com/office/powerpoint/2010/main" val="365999439"/>
+      </p:ext>
+    </p:extLst>
+  </p:cSld>
+  <p:clrMapOvr>
+    <a:masterClrMapping/>
+  </p:clrMapOvr>
+</p:sld>
+</file>
+
+<file path=ppt/slides/slide7.xml><?xml version="1.0" encoding="utf-8"?>
 <p:sld xmlns:a="http://schemas.openxmlformats.org/drawingml/2006/main" xmlns:r="http://schemas.openxmlformats.org/officeDocument/2006/relationships" xmlns:p="http://schemas.openxmlformats.org/presentationml/2006/main">
   <p:cSld>
     <p:spTree>
@@ -6278,7 +7298,7 @@
 </p:sld>
 </file>
 
-<file path=ppt/slides/slide6.xml><?xml version="1.0" encoding="utf-8"?>
+<file path=ppt/slides/slide8.xml><?xml version="1.0" encoding="utf-8"?>
 <p:sld xmlns:a="http://schemas.openxmlformats.org/drawingml/2006/main" xmlns:r="http://schemas.openxmlformats.org/officeDocument/2006/relationships" xmlns:p="http://schemas.openxmlformats.org/presentationml/2006/main">
   <p:cSld>
     <p:spTree>
@@ -6904,197 +7924,6 @@
 </p:sld>
 </file>
 
-<file path=ppt/slides/slide7.xml><?xml version="1.0" encoding="utf-8"?>
-<p:sld xmlns:a="http://schemas.openxmlformats.org/drawingml/2006/main" xmlns:r="http://schemas.openxmlformats.org/officeDocument/2006/relationships" xmlns:p="http://schemas.openxmlformats.org/presentationml/2006/main">
-  <p:cSld>
-    <p:spTree>
-      <p:nvGrpSpPr>
-        <p:cNvPr id="1" name=""/>
-        <p:cNvGrpSpPr/>
-        <p:nvPr/>
-      </p:nvGrpSpPr>
-      <p:grpSpPr>
-        <a:xfrm>
-          <a:off x="0" y="0"/>
-          <a:ext cx="0" cy="0"/>
-          <a:chOff x="0" y="0"/>
-          <a:chExt cx="0" cy="0"/>
-        </a:xfrm>
-      </p:grpSpPr>
-      <p:sp>
-        <p:nvSpPr>
-          <p:cNvPr id="2" name="Title 1">
-            <a:extLst>
-              <a:ext uri="{FF2B5EF4-FFF2-40B4-BE49-F238E27FC236}">
-                <a16:creationId xmlns:a16="http://schemas.microsoft.com/office/drawing/2014/main" id="{45A7D8F7-9FA3-4A30-BDA6-9F7EBC645BA3}"/>
-              </a:ext>
-            </a:extLst>
-          </p:cNvPr>
-          <p:cNvSpPr>
-            <a:spLocks noGrp="1"/>
-          </p:cNvSpPr>
-          <p:nvPr>
-            <p:ph type="title"/>
-          </p:nvPr>
-        </p:nvSpPr>
-        <p:spPr/>
-        <p:txBody>
-          <a:bodyPr/>
-          <a:lstStyle/>
-          <a:p>
-            <a:r>
-              <a:rPr lang="en-US" dirty="0"/>
-              <a:t>Simple learning(?)</a:t>
-            </a:r>
-          </a:p>
-        </p:txBody>
-      </p:sp>
-      <p:sp>
-        <p:nvSpPr>
-          <p:cNvPr id="3" name="Content Placeholder 2">
-            <a:extLst>
-              <a:ext uri="{FF2B5EF4-FFF2-40B4-BE49-F238E27FC236}">
-                <a16:creationId xmlns:a16="http://schemas.microsoft.com/office/drawing/2014/main" id="{30BB70A6-098B-457B-9763-C2F6C0CF03A1}"/>
-              </a:ext>
-            </a:extLst>
-          </p:cNvPr>
-          <p:cNvSpPr>
-            <a:spLocks noGrp="1"/>
-          </p:cNvSpPr>
-          <p:nvPr>
-            <p:ph idx="1"/>
-          </p:nvPr>
-        </p:nvSpPr>
-        <p:spPr/>
-        <p:txBody>
-          <a:bodyPr/>
-          <a:lstStyle/>
-          <a:p>
-            <a:r>
-              <a:rPr lang="en-US" dirty="0"/>
-              <a:t>When detect a new action in a sentence</a:t>
-            </a:r>
-          </a:p>
-          <a:p>
-            <a:pPr lvl="1"/>
-            <a:r>
-              <a:rPr lang="en-US" dirty="0"/>
-              <a:t>1. Look up the state list (Main subject of this sentence)</a:t>
-            </a:r>
-          </a:p>
-          <a:p>
-            <a:pPr lvl="1"/>
-            <a:r>
-              <a:rPr lang="en-US" dirty="0"/>
-              <a:t>2.  For each state operation (update, minus, add), choose </a:t>
-            </a:r>
-            <a:r>
-              <a:rPr lang="en-US"/>
-              <a:t>a random</a:t>
-            </a:r>
-            <a:endParaRPr lang="en-US" dirty="0"/>
-          </a:p>
-        </p:txBody>
-      </p:sp>
-    </p:spTree>
-    <p:extLst>
-      <p:ext uri="{BB962C8B-B14F-4D97-AF65-F5344CB8AC3E}">
-        <p14:creationId xmlns:p14="http://schemas.microsoft.com/office/powerpoint/2010/main" val="4264672275"/>
-      </p:ext>
-    </p:extLst>
-  </p:cSld>
-  <p:clrMapOvr>
-    <a:masterClrMapping/>
-  </p:clrMapOvr>
-</p:sld>
-</file>
-
-<file path=ppt/slides/slide8.xml><?xml version="1.0" encoding="utf-8"?>
-<p:sld xmlns:a="http://schemas.openxmlformats.org/drawingml/2006/main" xmlns:r="http://schemas.openxmlformats.org/officeDocument/2006/relationships" xmlns:p="http://schemas.openxmlformats.org/presentationml/2006/main">
-  <p:cSld>
-    <p:spTree>
-      <p:nvGrpSpPr>
-        <p:cNvPr id="1" name=""/>
-        <p:cNvGrpSpPr/>
-        <p:nvPr/>
-      </p:nvGrpSpPr>
-      <p:grpSpPr>
-        <a:xfrm>
-          <a:off x="0" y="0"/>
-          <a:ext cx="0" cy="0"/>
-          <a:chOff x="0" y="0"/>
-          <a:chExt cx="0" cy="0"/>
-        </a:xfrm>
-      </p:grpSpPr>
-      <p:sp>
-        <p:nvSpPr>
-          <p:cNvPr id="2" name="Title 1">
-            <a:extLst>
-              <a:ext uri="{FF2B5EF4-FFF2-40B4-BE49-F238E27FC236}">
-                <a16:creationId xmlns:a16="http://schemas.microsoft.com/office/drawing/2014/main" id="{0896BAB0-67B5-458A-87FA-614F1243266A}"/>
-              </a:ext>
-            </a:extLst>
-          </p:cNvPr>
-          <p:cNvSpPr>
-            <a:spLocks noGrp="1"/>
-          </p:cNvSpPr>
-          <p:nvPr>
-            <p:ph type="title"/>
-          </p:nvPr>
-        </p:nvSpPr>
-        <p:spPr/>
-        <p:txBody>
-          <a:bodyPr/>
-          <a:lstStyle/>
-          <a:p>
-            <a:r>
-              <a:rPr lang="en-US" dirty="0"/>
-              <a:t>Entities in a sentence</a:t>
-            </a:r>
-          </a:p>
-        </p:txBody>
-      </p:sp>
-      <p:sp>
-        <p:nvSpPr>
-          <p:cNvPr id="3" name="Content Placeholder 2">
-            <a:extLst>
-              <a:ext uri="{FF2B5EF4-FFF2-40B4-BE49-F238E27FC236}">
-                <a16:creationId xmlns:a16="http://schemas.microsoft.com/office/drawing/2014/main" id="{7F2AEC45-C667-4A69-9FC7-8E6751E84E77}"/>
-              </a:ext>
-            </a:extLst>
-          </p:cNvPr>
-          <p:cNvSpPr>
-            <a:spLocks noGrp="1"/>
-          </p:cNvSpPr>
-          <p:nvPr>
-            <p:ph idx="1"/>
-          </p:nvPr>
-        </p:nvSpPr>
-        <p:spPr/>
-        <p:txBody>
-          <a:bodyPr/>
-          <a:lstStyle/>
-          <a:p>
-            <a:r>
-              <a:rPr lang="en-US" dirty="0"/>
-              <a:t>Actor, location, non-actor item……</a:t>
-            </a:r>
-          </a:p>
-        </p:txBody>
-      </p:sp>
-    </p:spTree>
-    <p:extLst>
-      <p:ext uri="{BB962C8B-B14F-4D97-AF65-F5344CB8AC3E}">
-        <p14:creationId xmlns:p14="http://schemas.microsoft.com/office/powerpoint/2010/main" val="1070168866"/>
-      </p:ext>
-    </p:extLst>
-  </p:cSld>
-  <p:clrMapOvr>
-    <a:masterClrMapping/>
-  </p:clrMapOvr>
-</p:sld>
-</file>
-
 <file path=ppt/slides/slide9.xml><?xml version="1.0" encoding="utf-8"?>
 <p:sld xmlns:a="http://schemas.openxmlformats.org/drawingml/2006/main" xmlns:r="http://schemas.openxmlformats.org/officeDocument/2006/relationships" xmlns:p="http://schemas.openxmlformats.org/presentationml/2006/main">
   <p:cSld>
@@ -7117,7 +7946,7 @@
           <p:cNvPr id="2" name="Title 1">
             <a:extLst>
               <a:ext uri="{FF2B5EF4-FFF2-40B4-BE49-F238E27FC236}">
-                <a16:creationId xmlns:a16="http://schemas.microsoft.com/office/drawing/2014/main" id="{D9DD8290-0F94-4869-A15E-55897323AADF}"/>
+                <a16:creationId xmlns:a16="http://schemas.microsoft.com/office/drawing/2014/main" id="{45A7D8F7-9FA3-4A30-BDA6-9F7EBC645BA3}"/>
               </a:ext>
             </a:extLst>
           </p:cNvPr>
@@ -7135,7 +7964,7 @@
           <a:p>
             <a:r>
               <a:rPr lang="en-US" dirty="0"/>
-              <a:t>Visualization interface</a:t>
+              <a:t>Simple learning(?)</a:t>
             </a:r>
           </a:p>
         </p:txBody>
@@ -7145,7 +7974,7 @@
           <p:cNvPr id="3" name="Content Placeholder 2">
             <a:extLst>
               <a:ext uri="{FF2B5EF4-FFF2-40B4-BE49-F238E27FC236}">
-                <a16:creationId xmlns:a16="http://schemas.microsoft.com/office/drawing/2014/main" id="{99B0FBBD-26C1-4CA2-95EC-7D7F1281CB7C}"/>
+                <a16:creationId xmlns:a16="http://schemas.microsoft.com/office/drawing/2014/main" id="{30BB70A6-098B-457B-9763-C2F6C0CF03A1}"/>
               </a:ext>
             </a:extLst>
           </p:cNvPr>
@@ -7161,14 +7990,36 @@
           <a:bodyPr/>
           <a:lstStyle/>
           <a:p>
-            <a:endParaRPr lang="en-US"/>
+            <a:r>
+              <a:rPr lang="en-US" dirty="0"/>
+              <a:t>When detect a new action in a sentence</a:t>
+            </a:r>
+          </a:p>
+          <a:p>
+            <a:pPr lvl="1"/>
+            <a:r>
+              <a:rPr lang="en-US" dirty="0"/>
+              <a:t>1. Look up the state list (Main subject of this sentence)</a:t>
+            </a:r>
+          </a:p>
+          <a:p>
+            <a:pPr lvl="1"/>
+            <a:r>
+              <a:rPr lang="en-US" dirty="0"/>
+              <a:t>2.  For each state operation (update, minus, add), choose </a:t>
+            </a:r>
+            <a:r>
+              <a:rPr lang="en-US"/>
+              <a:t>a random</a:t>
+            </a:r>
+            <a:endParaRPr lang="en-US" dirty="0"/>
           </a:p>
         </p:txBody>
       </p:sp>
     </p:spTree>
     <p:extLst>
       <p:ext uri="{BB962C8B-B14F-4D97-AF65-F5344CB8AC3E}">
-        <p14:creationId xmlns:p14="http://schemas.microsoft.com/office/powerpoint/2010/main" val="3211698571"/>
+        <p14:creationId xmlns:p14="http://schemas.microsoft.com/office/powerpoint/2010/main" val="4264672275"/>
       </p:ext>
     </p:extLst>
   </p:cSld>

</xml_diff>